<commit_message>
added final notebook and more data
</commit_message>
<xml_diff>
--- a/presentations/JAG-team-strategy.pptx
+++ b/presentations/JAG-team-strategy.pptx
@@ -5,13 +5,14 @@
     <p:sldMasterId id="2147483648" r:id="rId1"/>
   </p:sldMasterIdLst>
   <p:notesMasterIdLst>
-    <p:notesMasterId r:id="rId6"/>
+    <p:notesMasterId r:id="rId7"/>
   </p:notesMasterIdLst>
   <p:sldIdLst>
     <p:sldId id="256" r:id="rId2"/>
     <p:sldId id="257" r:id="rId3"/>
     <p:sldId id="258" r:id="rId4"/>
-    <p:sldId id="262" r:id="rId5"/>
+    <p:sldId id="263" r:id="rId5"/>
+    <p:sldId id="262" r:id="rId6"/>
   </p:sldIdLst>
   <p:sldSz cx="12192000" cy="6858000"/>
   <p:notesSz cx="6858000" cy="9144000"/>
@@ -3155,7 +3156,7 @@
           <a:p>
             <a:fld id="{65F80200-39B7-44AA-BC18-67BEE3C7A720}" type="datetimeFigureOut">
               <a:rPr lang="en-US" smtClean="0"/>
-              <a:t>4/15/2024</a:t>
+              <a:t>4/17/2024</a:t>
             </a:fld>
             <a:endParaRPr lang="en-US"/>
           </a:p>
@@ -3506,6 +3507,359 @@
 </p:notes>
 </file>
 
+<file path=ppt/notesSlides/notesSlide2.xml><?xml version="1.0" encoding="utf-8"?>
+<p:notes xmlns:a="http://schemas.openxmlformats.org/drawingml/2006/main" xmlns:r="http://schemas.openxmlformats.org/officeDocument/2006/relationships" xmlns:p="http://schemas.openxmlformats.org/presentationml/2006/main">
+  <p:cSld>
+    <p:spTree>
+      <p:nvGrpSpPr>
+        <p:cNvPr id="1" name=""/>
+        <p:cNvGrpSpPr/>
+        <p:nvPr/>
+      </p:nvGrpSpPr>
+      <p:grpSpPr>
+        <a:xfrm>
+          <a:off x="0" y="0"/>
+          <a:ext cx="0" cy="0"/>
+          <a:chOff x="0" y="0"/>
+          <a:chExt cx="0" cy="0"/>
+        </a:xfrm>
+      </p:grpSpPr>
+      <p:sp>
+        <p:nvSpPr>
+          <p:cNvPr id="2" name="Slide Image Placeholder 1"/>
+          <p:cNvSpPr>
+            <a:spLocks noGrp="1" noRot="1" noChangeAspect="1"/>
+          </p:cNvSpPr>
+          <p:nvPr>
+            <p:ph type="sldImg"/>
+          </p:nvPr>
+        </p:nvSpPr>
+        <p:spPr/>
+      </p:sp>
+      <p:sp>
+        <p:nvSpPr>
+          <p:cNvPr id="3" name="Notes Placeholder 2"/>
+          <p:cNvSpPr>
+            <a:spLocks noGrp="1"/>
+          </p:cNvSpPr>
+          <p:nvPr>
+            <p:ph type="body" idx="1"/>
+          </p:nvPr>
+        </p:nvSpPr>
+        <p:spPr/>
+        <p:txBody>
+          <a:bodyPr/>
+          <a:lstStyle/>
+          <a:p>
+            <a:pPr rtl="0">
+              <a:spcBef>
+                <a:spcPts val="0"/>
+              </a:spcBef>
+              <a:spcAft>
+                <a:spcPts val="0"/>
+              </a:spcAft>
+            </a:pPr>
+            <a:r>
+              <a:rPr lang="en-US" sz="1200" b="0" i="0" strike="noStrike" dirty="0">
+                <a:effectLst/>
+                <a:latin typeface="Open Sans" panose="020B0606030504020204" pitchFamily="34" charset="0"/>
+                <a:ea typeface="Open Sans" panose="020B0606030504020204" pitchFamily="34" charset="0"/>
+                <a:cs typeface="Open Sans" panose="020B0606030504020204" pitchFamily="34" charset="0"/>
+              </a:rPr>
+              <a:t>By County:</a:t>
+            </a:r>
+          </a:p>
+          <a:p>
+            <a:pPr rtl="0">
+              <a:spcBef>
+                <a:spcPts val="0"/>
+              </a:spcBef>
+              <a:spcAft>
+                <a:spcPts val="0"/>
+              </a:spcAft>
+            </a:pPr>
+            <a:endParaRPr lang="en-US" sz="1200" b="0" i="0" strike="noStrike" dirty="0">
+              <a:effectLst/>
+              <a:latin typeface="Open Sans" panose="020B0606030504020204" pitchFamily="34" charset="0"/>
+              <a:ea typeface="Open Sans" panose="020B0606030504020204" pitchFamily="34" charset="0"/>
+              <a:cs typeface="Open Sans" panose="020B0606030504020204" pitchFamily="34" charset="0"/>
+            </a:endParaRPr>
+          </a:p>
+          <a:p>
+            <a:pPr rtl="0">
+              <a:spcBef>
+                <a:spcPts val="0"/>
+              </a:spcBef>
+              <a:spcAft>
+                <a:spcPts val="0"/>
+              </a:spcAft>
+            </a:pPr>
+            <a:r>
+              <a:rPr lang="en-US" sz="1200" b="0" i="0" strike="noStrike" dirty="0">
+                <a:effectLst/>
+                <a:latin typeface="Open Sans" panose="020B0606030504020204" pitchFamily="34" charset="0"/>
+                <a:ea typeface="Open Sans" panose="020B0606030504020204" pitchFamily="34" charset="0"/>
+                <a:cs typeface="Open Sans" panose="020B0606030504020204" pitchFamily="34" charset="0"/>
+              </a:rPr>
+              <a:t>HPSA = County Tract &amp; static Year Range - Health care shortages</a:t>
+            </a:r>
+          </a:p>
+          <a:p>
+            <a:pPr rtl="0">
+              <a:spcBef>
+                <a:spcPts val="0"/>
+              </a:spcBef>
+              <a:spcAft>
+                <a:spcPts val="0"/>
+              </a:spcAft>
+            </a:pPr>
+            <a:r>
+              <a:rPr lang="en-US" sz="1200" b="0" i="0" strike="noStrike" dirty="0">
+                <a:effectLst/>
+                <a:latin typeface="Open Sans" panose="020B0606030504020204" pitchFamily="34" charset="0"/>
+                <a:ea typeface="Open Sans" panose="020B0606030504020204" pitchFamily="34" charset="0"/>
+                <a:cs typeface="Open Sans" panose="020B0606030504020204" pitchFamily="34" charset="0"/>
+              </a:rPr>
+              <a:t>ARCOS = City/county &amp; date 2006-2019 - </a:t>
+            </a:r>
+            <a:r>
+              <a:rPr lang="en-US" sz="1200" b="0" i="0" strike="noStrike" dirty="0" err="1">
+                <a:effectLst/>
+                <a:latin typeface="Open Sans" panose="020B0606030504020204" pitchFamily="34" charset="0"/>
+                <a:ea typeface="Open Sans" panose="020B0606030504020204" pitchFamily="34" charset="0"/>
+                <a:cs typeface="Open Sans" panose="020B0606030504020204" pitchFamily="34" charset="0"/>
+              </a:rPr>
+              <a:t>opiod</a:t>
+            </a:r>
+            <a:r>
+              <a:rPr lang="en-US" sz="1200" b="0" i="0" strike="noStrike" dirty="0">
+                <a:effectLst/>
+                <a:latin typeface="Open Sans" panose="020B0606030504020204" pitchFamily="34" charset="0"/>
+                <a:ea typeface="Open Sans" panose="020B0606030504020204" pitchFamily="34" charset="0"/>
+                <a:cs typeface="Open Sans" panose="020B0606030504020204" pitchFamily="34" charset="0"/>
+              </a:rPr>
+              <a:t> drug purchases from manufacturer to supplier</a:t>
+            </a:r>
+          </a:p>
+          <a:p>
+            <a:pPr rtl="0">
+              <a:spcBef>
+                <a:spcPts val="0"/>
+              </a:spcBef>
+              <a:spcAft>
+                <a:spcPts val="0"/>
+              </a:spcAft>
+            </a:pPr>
+            <a:r>
+              <a:rPr lang="en-US" sz="1200" b="0" i="0" strike="noStrike" dirty="0">
+                <a:effectLst/>
+                <a:latin typeface="Open Sans" panose="020B0606030504020204" pitchFamily="34" charset="0"/>
+                <a:ea typeface="Open Sans" panose="020B0606030504020204" pitchFamily="34" charset="0"/>
+                <a:cs typeface="Open Sans" panose="020B0606030504020204" pitchFamily="34" charset="0"/>
+              </a:rPr>
+              <a:t>CDC Cause of Death = County &amp; Years between 2018-2021 - overdose</a:t>
+            </a:r>
+          </a:p>
+          <a:p>
+            <a:pPr rtl="0">
+              <a:spcBef>
+                <a:spcPts val="0"/>
+              </a:spcBef>
+              <a:spcAft>
+                <a:spcPts val="0"/>
+              </a:spcAft>
+            </a:pPr>
+            <a:r>
+              <a:rPr lang="en-US" sz="1200" b="0" i="0" strike="noStrike" dirty="0">
+                <a:effectLst/>
+                <a:latin typeface="Open Sans" panose="020B0606030504020204" pitchFamily="34" charset="0"/>
+                <a:ea typeface="Open Sans" panose="020B0606030504020204" pitchFamily="34" charset="0"/>
+                <a:cs typeface="Open Sans" panose="020B0606030504020204" pitchFamily="34" charset="0"/>
+              </a:rPr>
+              <a:t>Census = County Tract/ City Tract &amp; Year - income/employment/</a:t>
+            </a:r>
+            <a:r>
+              <a:rPr lang="en-US" sz="1200" b="0" i="0" strike="noStrike" dirty="0" err="1">
+                <a:effectLst/>
+                <a:latin typeface="Open Sans" panose="020B0606030504020204" pitchFamily="34" charset="0"/>
+                <a:ea typeface="Open Sans" panose="020B0606030504020204" pitchFamily="34" charset="0"/>
+                <a:cs typeface="Open Sans" panose="020B0606030504020204" pitchFamily="34" charset="0"/>
+              </a:rPr>
+              <a:t>etc</a:t>
+            </a:r>
+            <a:endParaRPr lang="en-US" sz="1200" b="0" i="0" strike="noStrike" dirty="0">
+              <a:effectLst/>
+              <a:latin typeface="Open Sans" panose="020B0606030504020204" pitchFamily="34" charset="0"/>
+              <a:ea typeface="Open Sans" panose="020B0606030504020204" pitchFamily="34" charset="0"/>
+              <a:cs typeface="Open Sans" panose="020B0606030504020204" pitchFamily="34" charset="0"/>
+            </a:endParaRPr>
+          </a:p>
+          <a:p>
+            <a:pPr rtl="0">
+              <a:spcBef>
+                <a:spcPts val="0"/>
+              </a:spcBef>
+              <a:spcAft>
+                <a:spcPts val="0"/>
+              </a:spcAft>
+            </a:pPr>
+            <a:r>
+              <a:rPr lang="en-US" sz="1200" b="0" i="0" strike="noStrike" dirty="0">
+                <a:effectLst/>
+                <a:latin typeface="Open Sans" panose="020B0606030504020204" pitchFamily="34" charset="0"/>
+                <a:ea typeface="Open Sans" panose="020B0606030504020204" pitchFamily="34" charset="0"/>
+                <a:cs typeface="Open Sans" panose="020B0606030504020204" pitchFamily="34" charset="0"/>
+              </a:rPr>
+              <a:t>FBI LE = County &amp; Year - full time law enforcement officers </a:t>
+            </a:r>
+          </a:p>
+          <a:p>
+            <a:pPr rtl="0">
+              <a:spcBef>
+                <a:spcPts val="0"/>
+              </a:spcBef>
+              <a:spcAft>
+                <a:spcPts val="0"/>
+              </a:spcAft>
+            </a:pPr>
+            <a:endParaRPr lang="en-US" sz="1200" b="0" i="0" strike="noStrike" dirty="0">
+              <a:effectLst/>
+              <a:latin typeface="Open Sans" panose="020B0606030504020204" pitchFamily="34" charset="0"/>
+              <a:ea typeface="Open Sans" panose="020B0606030504020204" pitchFamily="34" charset="0"/>
+              <a:cs typeface="Open Sans" panose="020B0606030504020204" pitchFamily="34" charset="0"/>
+            </a:endParaRPr>
+          </a:p>
+          <a:p>
+            <a:pPr rtl="0">
+              <a:spcBef>
+                <a:spcPts val="0"/>
+              </a:spcBef>
+              <a:spcAft>
+                <a:spcPts val="0"/>
+              </a:spcAft>
+            </a:pPr>
+            <a:r>
+              <a:rPr lang="en-US" sz="1200" b="0" i="0" strike="noStrike" dirty="0">
+                <a:effectLst/>
+                <a:latin typeface="Open Sans" panose="020B0606030504020204" pitchFamily="34" charset="0"/>
+                <a:ea typeface="Open Sans" panose="020B0606030504020204" pitchFamily="34" charset="0"/>
+                <a:cs typeface="Open Sans" panose="020B0606030504020204" pitchFamily="34" charset="0"/>
+              </a:rPr>
+              <a:t>Potential Target Variable: </a:t>
+            </a:r>
+          </a:p>
+          <a:p>
+            <a:pPr rtl="0">
+              <a:spcBef>
+                <a:spcPts val="0"/>
+              </a:spcBef>
+              <a:spcAft>
+                <a:spcPts val="0"/>
+              </a:spcAft>
+            </a:pPr>
+            <a:endParaRPr lang="en-US" sz="1200" b="0" i="0" strike="noStrike" dirty="0">
+              <a:effectLst/>
+              <a:latin typeface="Open Sans" panose="020B0606030504020204" pitchFamily="34" charset="0"/>
+              <a:ea typeface="Open Sans" panose="020B0606030504020204" pitchFamily="34" charset="0"/>
+              <a:cs typeface="Open Sans" panose="020B0606030504020204" pitchFamily="34" charset="0"/>
+            </a:endParaRPr>
+          </a:p>
+          <a:p>
+            <a:pPr rtl="0">
+              <a:spcBef>
+                <a:spcPts val="0"/>
+              </a:spcBef>
+              <a:spcAft>
+                <a:spcPts val="0"/>
+              </a:spcAft>
+            </a:pPr>
+            <a:r>
+              <a:rPr lang="en-US" sz="1200" b="0" i="0" strike="noStrike" dirty="0">
+                <a:effectLst/>
+                <a:latin typeface="Open Sans" panose="020B0606030504020204" pitchFamily="34" charset="0"/>
+                <a:ea typeface="Open Sans" panose="020B0606030504020204" pitchFamily="34" charset="0"/>
+                <a:cs typeface="Open Sans" panose="020B0606030504020204" pitchFamily="34" charset="0"/>
+              </a:rPr>
+              <a:t>Health care shortage (either at the county level using all available data or at the county tract level using just census data)</a:t>
+            </a:r>
+          </a:p>
+          <a:p>
+            <a:pPr rtl="0">
+              <a:spcBef>
+                <a:spcPts val="0"/>
+              </a:spcBef>
+              <a:spcAft>
+                <a:spcPts val="0"/>
+              </a:spcAft>
+            </a:pPr>
+            <a:r>
+              <a:rPr lang="en-US" sz="1200" b="0" i="0" strike="noStrike" dirty="0">
+                <a:effectLst/>
+                <a:latin typeface="Open Sans" panose="020B0606030504020204" pitchFamily="34" charset="0"/>
+                <a:ea typeface="Open Sans" panose="020B0606030504020204" pitchFamily="34" charset="0"/>
+                <a:cs typeface="Open Sans" panose="020B0606030504020204" pitchFamily="34" charset="0"/>
+              </a:rPr>
+              <a:t>Ex 1: Can we predict whether a census tract will be an HPSA given general census data?</a:t>
+            </a:r>
+          </a:p>
+          <a:p>
+            <a:pPr rtl="0">
+              <a:spcBef>
+                <a:spcPts val="0"/>
+              </a:spcBef>
+              <a:spcAft>
+                <a:spcPts val="0"/>
+              </a:spcAft>
+            </a:pPr>
+            <a:r>
+              <a:rPr lang="en-US" sz="1200" b="0" i="0" strike="noStrike" dirty="0">
+                <a:effectLst/>
+                <a:latin typeface="Open Sans" panose="020B0606030504020204" pitchFamily="34" charset="0"/>
+                <a:ea typeface="Open Sans" panose="020B0606030504020204" pitchFamily="34" charset="0"/>
+                <a:cs typeface="Open Sans" panose="020B0606030504020204" pitchFamily="34" charset="0"/>
+              </a:rPr>
+              <a:t>Ex 2: What are good predictors for determining the severity of a health care shortage in a given County?</a:t>
+            </a:r>
+            <a:endParaRPr lang="en-US" dirty="0"/>
+          </a:p>
+        </p:txBody>
+      </p:sp>
+      <p:sp>
+        <p:nvSpPr>
+          <p:cNvPr id="4" name="Slide Number Placeholder 3"/>
+          <p:cNvSpPr>
+            <a:spLocks noGrp="1"/>
+          </p:cNvSpPr>
+          <p:nvPr>
+            <p:ph type="sldNum" sz="quarter" idx="5"/>
+          </p:nvPr>
+        </p:nvSpPr>
+        <p:spPr/>
+        <p:txBody>
+          <a:bodyPr/>
+          <a:lstStyle/>
+          <a:p>
+            <a:fld id="{6F4038BA-FBC3-4B92-9607-90AA47762397}" type="slidenum">
+              <a:rPr lang="en-US" smtClean="0"/>
+              <a:t>4</a:t>
+            </a:fld>
+            <a:endParaRPr lang="en-US"/>
+          </a:p>
+        </p:txBody>
+      </p:sp>
+    </p:spTree>
+    <p:extLst>
+      <p:ext uri="{BB962C8B-B14F-4D97-AF65-F5344CB8AC3E}">
+        <p14:creationId xmlns:p14="http://schemas.microsoft.com/office/powerpoint/2010/main" val="3564066158"/>
+      </p:ext>
+    </p:extLst>
+  </p:cSld>
+  <p:clrMapOvr>
+    <a:masterClrMapping/>
+  </p:clrMapOvr>
+</p:notes>
+</file>
+
 <file path=ppt/slideLayouts/slideLayout1.xml><?xml version="1.0" encoding="utf-8"?>
 <p:sldLayout xmlns:a="http://schemas.openxmlformats.org/drawingml/2006/main" xmlns:r="http://schemas.openxmlformats.org/officeDocument/2006/relationships" xmlns:p="http://schemas.openxmlformats.org/presentationml/2006/main" type="title" preserve="1">
   <p:cSld name="Title Slide">
@@ -3653,7 +4007,7 @@
           <a:p>
             <a:fld id="{B72488C9-BD5C-4694-ADF6-DD3A108372C8}" type="datetimeFigureOut">
               <a:rPr lang="en-US" smtClean="0"/>
-              <a:t>4/15/2024</a:t>
+              <a:t>4/17/2024</a:t>
             </a:fld>
             <a:endParaRPr lang="en-US"/>
           </a:p>
@@ -3851,7 +4205,7 @@
           <a:p>
             <a:fld id="{B72488C9-BD5C-4694-ADF6-DD3A108372C8}" type="datetimeFigureOut">
               <a:rPr lang="en-US" smtClean="0"/>
-              <a:t>4/15/2024</a:t>
+              <a:t>4/17/2024</a:t>
             </a:fld>
             <a:endParaRPr lang="en-US"/>
           </a:p>
@@ -4059,7 +4413,7 @@
           <a:p>
             <a:fld id="{B72488C9-BD5C-4694-ADF6-DD3A108372C8}" type="datetimeFigureOut">
               <a:rPr lang="en-US" smtClean="0"/>
-              <a:t>4/15/2024</a:t>
+              <a:t>4/17/2024</a:t>
             </a:fld>
             <a:endParaRPr lang="en-US"/>
           </a:p>
@@ -4257,7 +4611,7 @@
           <a:p>
             <a:fld id="{B72488C9-BD5C-4694-ADF6-DD3A108372C8}" type="datetimeFigureOut">
               <a:rPr lang="en-US" smtClean="0"/>
-              <a:t>4/15/2024</a:t>
+              <a:t>4/17/2024</a:t>
             </a:fld>
             <a:endParaRPr lang="en-US"/>
           </a:p>
@@ -4532,7 +4886,7 @@
           <a:p>
             <a:fld id="{B72488C9-BD5C-4694-ADF6-DD3A108372C8}" type="datetimeFigureOut">
               <a:rPr lang="en-US" smtClean="0"/>
-              <a:t>4/15/2024</a:t>
+              <a:t>4/17/2024</a:t>
             </a:fld>
             <a:endParaRPr lang="en-US"/>
           </a:p>
@@ -4797,7 +5151,7 @@
           <a:p>
             <a:fld id="{B72488C9-BD5C-4694-ADF6-DD3A108372C8}" type="datetimeFigureOut">
               <a:rPr lang="en-US" smtClean="0"/>
-              <a:t>4/15/2024</a:t>
+              <a:t>4/17/2024</a:t>
             </a:fld>
             <a:endParaRPr lang="en-US"/>
           </a:p>
@@ -5209,7 +5563,7 @@
           <a:p>
             <a:fld id="{B72488C9-BD5C-4694-ADF6-DD3A108372C8}" type="datetimeFigureOut">
               <a:rPr lang="en-US" smtClean="0"/>
-              <a:t>4/15/2024</a:t>
+              <a:t>4/17/2024</a:t>
             </a:fld>
             <a:endParaRPr lang="en-US"/>
           </a:p>
@@ -5350,7 +5704,7 @@
           <a:p>
             <a:fld id="{B72488C9-BD5C-4694-ADF6-DD3A108372C8}" type="datetimeFigureOut">
               <a:rPr lang="en-US" smtClean="0"/>
-              <a:t>4/15/2024</a:t>
+              <a:t>4/17/2024</a:t>
             </a:fld>
             <a:endParaRPr lang="en-US"/>
           </a:p>
@@ -5463,7 +5817,7 @@
           <a:p>
             <a:fld id="{B72488C9-BD5C-4694-ADF6-DD3A108372C8}" type="datetimeFigureOut">
               <a:rPr lang="en-US" smtClean="0"/>
-              <a:t>4/15/2024</a:t>
+              <a:t>4/17/2024</a:t>
             </a:fld>
             <a:endParaRPr lang="en-US"/>
           </a:p>
@@ -5774,7 +6128,7 @@
           <a:p>
             <a:fld id="{B72488C9-BD5C-4694-ADF6-DD3A108372C8}" type="datetimeFigureOut">
               <a:rPr lang="en-US" smtClean="0"/>
-              <a:t>4/15/2024</a:t>
+              <a:t>4/17/2024</a:t>
             </a:fld>
             <a:endParaRPr lang="en-US"/>
           </a:p>
@@ -6062,7 +6416,7 @@
           <a:p>
             <a:fld id="{B72488C9-BD5C-4694-ADF6-DD3A108372C8}" type="datetimeFigureOut">
               <a:rPr lang="en-US" smtClean="0"/>
-              <a:t>4/15/2024</a:t>
+              <a:t>4/17/2024</a:t>
             </a:fld>
             <a:endParaRPr lang="en-US"/>
           </a:p>
@@ -6303,7 +6657,7 @@
           <a:p>
             <a:fld id="{B72488C9-BD5C-4694-ADF6-DD3A108372C8}" type="datetimeFigureOut">
               <a:rPr lang="en-US" smtClean="0"/>
-              <a:t>4/15/2024</a:t>
+              <a:t>4/17/2024</a:t>
             </a:fld>
             <a:endParaRPr lang="en-US"/>
           </a:p>
@@ -8547,6 +8901,1342 @@
 </file>
 
 <file path=ppt/slides/slide4.xml><?xml version="1.0" encoding="utf-8"?>
+<p:sld xmlns:a="http://schemas.openxmlformats.org/drawingml/2006/main" xmlns:r="http://schemas.openxmlformats.org/officeDocument/2006/relationships" xmlns:p="http://schemas.openxmlformats.org/presentationml/2006/main">
+  <p:cSld>
+    <p:bg>
+      <p:bgPr>
+        <a:solidFill>
+          <a:schemeClr val="bg1"/>
+        </a:solidFill>
+        <a:effectLst/>
+      </p:bgPr>
+    </p:bg>
+    <p:spTree>
+      <p:nvGrpSpPr>
+        <p:cNvPr id="1" name=""/>
+        <p:cNvGrpSpPr/>
+        <p:nvPr/>
+      </p:nvGrpSpPr>
+      <p:grpSpPr>
+        <a:xfrm>
+          <a:off x="0" y="0"/>
+          <a:ext cx="0" cy="0"/>
+          <a:chOff x="0" y="0"/>
+          <a:chExt cx="0" cy="0"/>
+        </a:xfrm>
+      </p:grpSpPr>
+      <p:sp useBgFill="1">
+        <p:nvSpPr>
+          <p:cNvPr id="8" name="Rectangle 7">
+            <a:extLst>
+              <a:ext uri="{FF2B5EF4-FFF2-40B4-BE49-F238E27FC236}">
+                <a16:creationId xmlns:a16="http://schemas.microsoft.com/office/drawing/2014/main" id="{1B15ED52-F352-441B-82BF-E0EA34836D08}"/>
+              </a:ext>
+              <a:ext uri="{C183D7F6-B498-43B3-948B-1728B52AA6E4}">
+                <adec:decorative xmlns:adec="http://schemas.microsoft.com/office/drawing/2017/decorative" val="1"/>
+              </a:ext>
+            </a:extLst>
+          </p:cNvPr>
+          <p:cNvSpPr>
+            <a:spLocks noGrp="1" noRot="1" noChangeAspect="1" noMove="1" noResize="1" noEditPoints="1" noAdjustHandles="1" noChangeArrowheads="1" noChangeShapeType="1" noTextEdit="1"/>
+          </p:cNvSpPr>
+          <p:nvPr>
+            <p:extLst>
+              <p:ext uri="{386F3935-93C4-4BCD-93E2-E3B085C9AB24}">
+                <p16:designElem xmlns:p16="http://schemas.microsoft.com/office/powerpoint/2015/main" val="1"/>
+              </p:ext>
+            </p:extLst>
+          </p:nvPr>
+        </p:nvSpPr>
+        <p:spPr>
+          <a:xfrm>
+            <a:off x="0" y="0"/>
+            <a:ext cx="12192000" cy="6858000"/>
+          </a:xfrm>
+          <a:prstGeom prst="rect">
+            <a:avLst/>
+          </a:prstGeom>
+          <a:ln w="12700" cap="flat" cmpd="sng" algn="ctr">
+            <a:noFill/>
+            <a:prstDash val="solid"/>
+            <a:miter lim="800000"/>
+          </a:ln>
+          <a:effectLst/>
+          <a:extLst>
+            <a:ext uri="{91240B29-F687-4F45-9708-019B960494DF}">
+              <a14:hiddenLine xmlns:a14="http://schemas.microsoft.com/office/drawing/2010/main" w="12700" cap="flat" cmpd="sng" algn="ctr">
+                <a:solidFill>
+                  <a:schemeClr val="accent1">
+                    <a:shade val="50000"/>
+                  </a:schemeClr>
+                </a:solidFill>
+                <a:prstDash val="solid"/>
+                <a:miter lim="800000"/>
+              </a14:hiddenLine>
+            </a:ext>
+          </a:extLst>
+        </p:spPr>
+        <p:style>
+          <a:lnRef idx="2">
+            <a:schemeClr val="accent1">
+              <a:shade val="50000"/>
+            </a:schemeClr>
+          </a:lnRef>
+          <a:fillRef idx="1">
+            <a:schemeClr val="accent1"/>
+          </a:fillRef>
+          <a:effectRef idx="0">
+            <a:schemeClr val="accent1"/>
+          </a:effectRef>
+          <a:fontRef idx="minor">
+            <a:schemeClr val="lt1"/>
+          </a:fontRef>
+        </p:style>
+        <p:txBody>
+          <a:bodyPr rtlCol="0" anchor="ctr"/>
+          <a:lstStyle/>
+          <a:p>
+            <a:pPr algn="ctr"/>
+            <a:endParaRPr lang="en-US"/>
+          </a:p>
+        </p:txBody>
+      </p:sp>
+      <p:sp>
+        <p:nvSpPr>
+          <p:cNvPr id="10" name="Rectangle 9">
+            <a:extLst>
+              <a:ext uri="{FF2B5EF4-FFF2-40B4-BE49-F238E27FC236}">
+                <a16:creationId xmlns:a16="http://schemas.microsoft.com/office/drawing/2014/main" id="{3B2E3793-BFE6-45A2-9B7B-E18844431C99}"/>
+              </a:ext>
+              <a:ext uri="{C183D7F6-B498-43B3-948B-1728B52AA6E4}">
+                <adec:decorative xmlns:adec="http://schemas.microsoft.com/office/drawing/2017/decorative" val="1"/>
+              </a:ext>
+            </a:extLst>
+          </p:cNvPr>
+          <p:cNvSpPr>
+            <a:spLocks noGrp="1" noRot="1" noChangeAspect="1" noMove="1" noResize="1" noEditPoints="1" noAdjustHandles="1" noChangeArrowheads="1" noChangeShapeType="1" noTextEdit="1"/>
+          </p:cNvSpPr>
+          <p:nvPr>
+            <p:extLst>
+              <p:ext uri="{386F3935-93C4-4BCD-93E2-E3B085C9AB24}">
+                <p16:designElem xmlns:p16="http://schemas.microsoft.com/office/powerpoint/2015/main" val="1"/>
+              </p:ext>
+            </p:extLst>
+          </p:nvPr>
+        </p:nvSpPr>
+        <p:spPr>
+          <a:xfrm flipH="1">
+            <a:off x="-1" y="-1"/>
+            <a:ext cx="12191998" cy="1590742"/>
+          </a:xfrm>
+          <a:prstGeom prst="rect">
+            <a:avLst/>
+          </a:prstGeom>
+          <a:gradFill>
+            <a:gsLst>
+              <a:gs pos="0">
+                <a:srgbClr val="000000"/>
+              </a:gs>
+              <a:gs pos="100000">
+                <a:schemeClr val="accent1">
+                  <a:lumMod val="75000"/>
+                </a:schemeClr>
+              </a:gs>
+            </a:gsLst>
+            <a:lin ang="8400000" scaled="0"/>
+          </a:gradFill>
+          <a:ln>
+            <a:noFill/>
+          </a:ln>
+        </p:spPr>
+        <p:style>
+          <a:lnRef idx="2">
+            <a:schemeClr val="accent1">
+              <a:shade val="50000"/>
+            </a:schemeClr>
+          </a:lnRef>
+          <a:fillRef idx="1">
+            <a:schemeClr val="accent1"/>
+          </a:fillRef>
+          <a:effectRef idx="0">
+            <a:schemeClr val="accent1"/>
+          </a:effectRef>
+          <a:fontRef idx="minor">
+            <a:schemeClr val="lt1"/>
+          </a:fontRef>
+        </p:style>
+        <p:txBody>
+          <a:bodyPr rtlCol="0" anchor="ctr"/>
+          <a:lstStyle/>
+          <a:p>
+            <a:pPr algn="ctr"/>
+            <a:endParaRPr lang="en-US"/>
+          </a:p>
+        </p:txBody>
+      </p:sp>
+      <p:sp>
+        <p:nvSpPr>
+          <p:cNvPr id="12" name="Rectangle 11">
+            <a:extLst>
+              <a:ext uri="{FF2B5EF4-FFF2-40B4-BE49-F238E27FC236}">
+                <a16:creationId xmlns:a16="http://schemas.microsoft.com/office/drawing/2014/main" id="{BC4C4868-CB8F-4AF9-9CDB-8108F2C19B67}"/>
+              </a:ext>
+              <a:ext uri="{C183D7F6-B498-43B3-948B-1728B52AA6E4}">
+                <adec:decorative xmlns:adec="http://schemas.microsoft.com/office/drawing/2017/decorative" val="1"/>
+              </a:ext>
+            </a:extLst>
+          </p:cNvPr>
+          <p:cNvSpPr>
+            <a:spLocks noGrp="1" noRot="1" noChangeAspect="1" noMove="1" noResize="1" noEditPoints="1" noAdjustHandles="1" noChangeArrowheads="1" noChangeShapeType="1" noTextEdit="1"/>
+          </p:cNvSpPr>
+          <p:nvPr>
+            <p:extLst>
+              <p:ext uri="{386F3935-93C4-4BCD-93E2-E3B085C9AB24}">
+                <p16:designElem xmlns:p16="http://schemas.microsoft.com/office/powerpoint/2015/main" val="1"/>
+              </p:ext>
+            </p:extLst>
+          </p:nvPr>
+        </p:nvSpPr>
+        <p:spPr>
+          <a:xfrm rot="10800000" flipH="1">
+            <a:off x="-3" y="0"/>
+            <a:ext cx="8115306" cy="1590742"/>
+          </a:xfrm>
+          <a:prstGeom prst="rect">
+            <a:avLst/>
+          </a:prstGeom>
+          <a:gradFill>
+            <a:gsLst>
+              <a:gs pos="20000">
+                <a:schemeClr val="accent1">
+                  <a:alpha val="0"/>
+                </a:schemeClr>
+              </a:gs>
+              <a:gs pos="100000">
+                <a:schemeClr val="accent1">
+                  <a:lumMod val="50000"/>
+                  <a:alpha val="55000"/>
+                </a:schemeClr>
+              </a:gs>
+            </a:gsLst>
+            <a:lin ang="13800000" scaled="0"/>
+          </a:gradFill>
+          <a:ln>
+            <a:noFill/>
+          </a:ln>
+        </p:spPr>
+        <p:style>
+          <a:lnRef idx="2">
+            <a:schemeClr val="accent1">
+              <a:shade val="50000"/>
+            </a:schemeClr>
+          </a:lnRef>
+          <a:fillRef idx="1">
+            <a:schemeClr val="accent1"/>
+          </a:fillRef>
+          <a:effectRef idx="0">
+            <a:schemeClr val="accent1"/>
+          </a:effectRef>
+          <a:fontRef idx="minor">
+            <a:schemeClr val="lt1"/>
+          </a:fontRef>
+        </p:style>
+        <p:txBody>
+          <a:bodyPr rtlCol="0" anchor="ctr"/>
+          <a:lstStyle/>
+          <a:p>
+            <a:pPr algn="ctr"/>
+            <a:endParaRPr lang="en-US"/>
+          </a:p>
+        </p:txBody>
+      </p:sp>
+      <p:sp>
+        <p:nvSpPr>
+          <p:cNvPr id="14" name="Rectangle 13">
+            <a:extLst>
+              <a:ext uri="{FF2B5EF4-FFF2-40B4-BE49-F238E27FC236}">
+                <a16:creationId xmlns:a16="http://schemas.microsoft.com/office/drawing/2014/main" id="{375E0459-6403-40CD-989D-56A4407CA12E}"/>
+              </a:ext>
+              <a:ext uri="{C183D7F6-B498-43B3-948B-1728B52AA6E4}">
+                <adec:decorative xmlns:adec="http://schemas.microsoft.com/office/drawing/2017/decorative" val="1"/>
+              </a:ext>
+            </a:extLst>
+          </p:cNvPr>
+          <p:cNvSpPr>
+            <a:spLocks noGrp="1" noRot="1" noChangeAspect="1" noMove="1" noResize="1" noEditPoints="1" noAdjustHandles="1" noChangeArrowheads="1" noChangeShapeType="1" noTextEdit="1"/>
+          </p:cNvSpPr>
+          <p:nvPr>
+            <p:extLst>
+              <p:ext uri="{386F3935-93C4-4BCD-93E2-E3B085C9AB24}">
+                <p16:designElem xmlns:p16="http://schemas.microsoft.com/office/powerpoint/2015/main" val="1"/>
+              </p:ext>
+            </p:extLst>
+          </p:nvPr>
+        </p:nvSpPr>
+        <p:spPr>
+          <a:xfrm flipH="1">
+            <a:off x="8115299" y="-1"/>
+            <a:ext cx="4076698" cy="1590742"/>
+          </a:xfrm>
+          <a:prstGeom prst="rect">
+            <a:avLst/>
+          </a:prstGeom>
+          <a:gradFill>
+            <a:gsLst>
+              <a:gs pos="0">
+                <a:schemeClr val="accent1">
+                  <a:alpha val="66000"/>
+                </a:schemeClr>
+              </a:gs>
+              <a:gs pos="100000">
+                <a:srgbClr val="000000">
+                  <a:alpha val="30000"/>
+                </a:srgbClr>
+              </a:gs>
+            </a:gsLst>
+            <a:lin ang="13200000" scaled="0"/>
+          </a:gradFill>
+          <a:ln>
+            <a:noFill/>
+          </a:ln>
+        </p:spPr>
+        <p:style>
+          <a:lnRef idx="2">
+            <a:schemeClr val="accent1">
+              <a:shade val="50000"/>
+            </a:schemeClr>
+          </a:lnRef>
+          <a:fillRef idx="1">
+            <a:schemeClr val="accent1"/>
+          </a:fillRef>
+          <a:effectRef idx="0">
+            <a:schemeClr val="accent1"/>
+          </a:effectRef>
+          <a:fontRef idx="minor">
+            <a:schemeClr val="lt1"/>
+          </a:fontRef>
+        </p:style>
+        <p:txBody>
+          <a:bodyPr rtlCol="0" anchor="ctr"/>
+          <a:lstStyle/>
+          <a:p>
+            <a:pPr algn="ctr"/>
+            <a:endParaRPr lang="en-US"/>
+          </a:p>
+        </p:txBody>
+      </p:sp>
+      <p:sp>
+        <p:nvSpPr>
+          <p:cNvPr id="16" name="Rectangle 15">
+            <a:extLst>
+              <a:ext uri="{FF2B5EF4-FFF2-40B4-BE49-F238E27FC236}">
+                <a16:creationId xmlns:a16="http://schemas.microsoft.com/office/drawing/2014/main" id="{53E5B1A8-3AC9-4BD1-9BBC-78CA94F2D1BA}"/>
+              </a:ext>
+              <a:ext uri="{C183D7F6-B498-43B3-948B-1728B52AA6E4}">
+                <adec:decorative xmlns:adec="http://schemas.microsoft.com/office/drawing/2017/decorative" val="1"/>
+              </a:ext>
+            </a:extLst>
+          </p:cNvPr>
+          <p:cNvSpPr>
+            <a:spLocks noGrp="1" noRot="1" noChangeAspect="1" noMove="1" noResize="1" noEditPoints="1" noAdjustHandles="1" noChangeArrowheads="1" noChangeShapeType="1" noTextEdit="1"/>
+          </p:cNvSpPr>
+          <p:nvPr>
+            <p:extLst>
+              <p:ext uri="{386F3935-93C4-4BCD-93E2-E3B085C9AB24}">
+                <p16:designElem xmlns:p16="http://schemas.microsoft.com/office/powerpoint/2015/main" val="1"/>
+              </p:ext>
+            </p:extLst>
+          </p:nvPr>
+        </p:nvSpPr>
+        <p:spPr>
+          <a:xfrm>
+            <a:off x="459350" y="-1"/>
+            <a:ext cx="11732646" cy="1597433"/>
+          </a:xfrm>
+          <a:prstGeom prst="rect">
+            <a:avLst/>
+          </a:prstGeom>
+          <a:gradFill>
+            <a:gsLst>
+              <a:gs pos="50000">
+                <a:srgbClr val="000000">
+                  <a:alpha val="0"/>
+                </a:srgbClr>
+              </a:gs>
+              <a:gs pos="99000">
+                <a:schemeClr val="accent1">
+                  <a:lumMod val="50000"/>
+                  <a:alpha val="52000"/>
+                </a:schemeClr>
+              </a:gs>
+            </a:gsLst>
+            <a:lin ang="16800000" scaled="0"/>
+          </a:gradFill>
+          <a:ln>
+            <a:noFill/>
+          </a:ln>
+        </p:spPr>
+        <p:style>
+          <a:lnRef idx="2">
+            <a:schemeClr val="accent1">
+              <a:shade val="50000"/>
+            </a:schemeClr>
+          </a:lnRef>
+          <a:fillRef idx="1">
+            <a:schemeClr val="accent1"/>
+          </a:fillRef>
+          <a:effectRef idx="0">
+            <a:schemeClr val="accent1"/>
+          </a:effectRef>
+          <a:fontRef idx="minor">
+            <a:schemeClr val="lt1"/>
+          </a:fontRef>
+        </p:style>
+        <p:txBody>
+          <a:bodyPr rtlCol="0" anchor="ctr"/>
+          <a:lstStyle/>
+          <a:p>
+            <a:pPr algn="ctr"/>
+            <a:endParaRPr lang="en-US"/>
+          </a:p>
+        </p:txBody>
+      </p:sp>
+      <p:sp>
+        <p:nvSpPr>
+          <p:cNvPr id="9" name="Title 1">
+            <a:extLst>
+              <a:ext uri="{FF2B5EF4-FFF2-40B4-BE49-F238E27FC236}">
+                <a16:creationId xmlns:a16="http://schemas.microsoft.com/office/drawing/2014/main" id="{8FC00B89-A35F-8655-755E-249E3D0100B1}"/>
+              </a:ext>
+            </a:extLst>
+          </p:cNvPr>
+          <p:cNvSpPr>
+            <a:spLocks noGrp="1"/>
+          </p:cNvSpPr>
+          <p:nvPr>
+            <p:ph type="title"/>
+          </p:nvPr>
+        </p:nvSpPr>
+        <p:spPr>
+          <a:xfrm>
+            <a:off x="699713" y="248038"/>
+            <a:ext cx="7063721" cy="1159200"/>
+          </a:xfrm>
+        </p:spPr>
+        <p:txBody>
+          <a:bodyPr vert="horz" lIns="91440" tIns="45720" rIns="91440" bIns="45720" rtlCol="0" anchor="ctr">
+            <a:normAutofit/>
+          </a:bodyPr>
+          <a:lstStyle/>
+          <a:p>
+            <a:r>
+              <a:rPr lang="en-US" sz="4000" kern="1200" dirty="0">
+                <a:solidFill>
+                  <a:srgbClr val="FFFFFF"/>
+                </a:solidFill>
+                <a:latin typeface="+mj-lt"/>
+                <a:ea typeface="+mj-ea"/>
+                <a:cs typeface="+mj-cs"/>
+              </a:rPr>
+              <a:t>Datasets (must use at least 2)</a:t>
+            </a:r>
+          </a:p>
+        </p:txBody>
+      </p:sp>
+      <p:sp>
+        <p:nvSpPr>
+          <p:cNvPr id="11" name="TextBox 10">
+            <a:extLst>
+              <a:ext uri="{FF2B5EF4-FFF2-40B4-BE49-F238E27FC236}">
+                <a16:creationId xmlns:a16="http://schemas.microsoft.com/office/drawing/2014/main" id="{0645F314-8441-340E-1879-CCE4F30BCF88}"/>
+              </a:ext>
+            </a:extLst>
+          </p:cNvPr>
+          <p:cNvSpPr txBox="1"/>
+          <p:nvPr/>
+        </p:nvSpPr>
+        <p:spPr>
+          <a:xfrm>
+            <a:off x="1693524" y="1789379"/>
+            <a:ext cx="8804952" cy="369332"/>
+          </a:xfrm>
+          <a:prstGeom prst="rect">
+            <a:avLst/>
+          </a:prstGeom>
+          <a:noFill/>
+        </p:spPr>
+        <p:txBody>
+          <a:bodyPr wrap="square" rtlCol="0">
+            <a:spAutoFit/>
+          </a:bodyPr>
+          <a:lstStyle/>
+          <a:p>
+            <a:pPr algn="ctr"/>
+            <a:r>
+              <a:rPr lang="en-US" sz="1800" b="1" i="0" strike="noStrike" dirty="0">
+                <a:effectLst/>
+                <a:latin typeface="Open Sans" panose="020B0606030504020204" pitchFamily="34" charset="0"/>
+                <a:ea typeface="Open Sans" panose="020B0606030504020204" pitchFamily="34" charset="0"/>
+                <a:cs typeface="Open Sans" panose="020B0606030504020204" pitchFamily="34" charset="0"/>
+              </a:rPr>
+              <a:t>Focus: Health Care Shortage, Crime, or Substance Abuse</a:t>
+            </a:r>
+          </a:p>
+        </p:txBody>
+      </p:sp>
+      <p:grpSp>
+        <p:nvGrpSpPr>
+          <p:cNvPr id="23" name="Group 22">
+            <a:extLst>
+              <a:ext uri="{FF2B5EF4-FFF2-40B4-BE49-F238E27FC236}">
+                <a16:creationId xmlns:a16="http://schemas.microsoft.com/office/drawing/2014/main" id="{A345F65E-CB4D-DF1A-F96F-1758672ADC0D}"/>
+              </a:ext>
+            </a:extLst>
+          </p:cNvPr>
+          <p:cNvGrpSpPr/>
+          <p:nvPr/>
+        </p:nvGrpSpPr>
+        <p:grpSpPr>
+          <a:xfrm>
+            <a:off x="375213" y="2186005"/>
+            <a:ext cx="11363218" cy="4565549"/>
+            <a:chOff x="534256" y="2350389"/>
+            <a:chExt cx="11363218" cy="4565549"/>
+          </a:xfrm>
+        </p:grpSpPr>
+        <p:sp>
+          <p:nvSpPr>
+            <p:cNvPr id="5" name="TextBox 4">
+              <a:extLst>
+                <a:ext uri="{FF2B5EF4-FFF2-40B4-BE49-F238E27FC236}">
+                  <a16:creationId xmlns:a16="http://schemas.microsoft.com/office/drawing/2014/main" id="{BB98A2A0-BB16-2A78-C547-17550134DBFD}"/>
+                </a:ext>
+              </a:extLst>
+            </p:cNvPr>
+            <p:cNvSpPr txBox="1"/>
+            <p:nvPr/>
+          </p:nvSpPr>
+          <p:spPr>
+            <a:xfrm>
+              <a:off x="612611" y="2483954"/>
+              <a:ext cx="5483387" cy="3785652"/>
+            </a:xfrm>
+            <a:prstGeom prst="rect">
+              <a:avLst/>
+            </a:prstGeom>
+            <a:noFill/>
+          </p:spPr>
+          <p:txBody>
+            <a:bodyPr wrap="square">
+              <a:spAutoFit/>
+            </a:bodyPr>
+            <a:lstStyle/>
+            <a:p>
+              <a:pPr rtl="0">
+                <a:spcBef>
+                  <a:spcPts val="0"/>
+                </a:spcBef>
+                <a:spcAft>
+                  <a:spcPts val="0"/>
+                </a:spcAft>
+              </a:pPr>
+              <a:r>
+                <a:rPr lang="en-US" sz="1600" b="1" i="0" strike="noStrike" dirty="0">
+                  <a:effectLst/>
+                  <a:latin typeface="Open Sans" panose="020B0606030504020204" pitchFamily="34" charset="0"/>
+                  <a:ea typeface="Open Sans" panose="020B0606030504020204" pitchFamily="34" charset="0"/>
+                  <a:cs typeface="Open Sans" panose="020B0606030504020204" pitchFamily="34" charset="0"/>
+                </a:rPr>
+                <a:t>By City:</a:t>
+              </a:r>
+            </a:p>
+            <a:p>
+              <a:pPr rtl="0">
+                <a:spcBef>
+                  <a:spcPts val="0"/>
+                </a:spcBef>
+                <a:spcAft>
+                  <a:spcPts val="0"/>
+                </a:spcAft>
+              </a:pPr>
+              <a:endParaRPr lang="en-US" sz="1400" b="0" i="0" strike="noStrike" dirty="0">
+                <a:effectLst/>
+                <a:latin typeface="Open Sans" panose="020B0606030504020204" pitchFamily="34" charset="0"/>
+                <a:ea typeface="Open Sans" panose="020B0606030504020204" pitchFamily="34" charset="0"/>
+                <a:cs typeface="Open Sans" panose="020B0606030504020204" pitchFamily="34" charset="0"/>
+              </a:endParaRPr>
+            </a:p>
+            <a:p>
+              <a:pPr rtl="0">
+                <a:spcBef>
+                  <a:spcPts val="0"/>
+                </a:spcBef>
+                <a:spcAft>
+                  <a:spcPts val="0"/>
+                </a:spcAft>
+              </a:pPr>
+              <a:r>
+                <a:rPr lang="en-US" sz="1400" b="1" i="0" strike="noStrike" dirty="0">
+                  <a:effectLst/>
+                  <a:latin typeface="Open Sans" panose="020B0606030504020204" pitchFamily="34" charset="0"/>
+                  <a:ea typeface="Open Sans" panose="020B0606030504020204" pitchFamily="34" charset="0"/>
+                  <a:cs typeface="Open Sans" panose="020B0606030504020204" pitchFamily="34" charset="0"/>
+                </a:rPr>
+                <a:t>FBI NIBRS </a:t>
+              </a:r>
+              <a:r>
+                <a:rPr lang="en-US" sz="1400" b="0" i="0" strike="noStrike" dirty="0">
+                  <a:effectLst/>
+                  <a:latin typeface="Open Sans" panose="020B0606030504020204" pitchFamily="34" charset="0"/>
+                  <a:ea typeface="Open Sans" panose="020B0606030504020204" pitchFamily="34" charset="0"/>
+                  <a:cs typeface="Open Sans" panose="020B0606030504020204" pitchFamily="34" charset="0"/>
+                </a:rPr>
+                <a:t>= City &amp; Year (any range) - Crime</a:t>
+              </a:r>
+            </a:p>
+            <a:p>
+              <a:pPr rtl="0">
+                <a:spcBef>
+                  <a:spcPts val="0"/>
+                </a:spcBef>
+                <a:spcAft>
+                  <a:spcPts val="0"/>
+                </a:spcAft>
+              </a:pPr>
+              <a:r>
+                <a:rPr lang="en-US" sz="1400" b="1" i="0" strike="noStrike" dirty="0">
+                  <a:effectLst/>
+                  <a:latin typeface="Open Sans" panose="020B0606030504020204" pitchFamily="34" charset="0"/>
+                  <a:ea typeface="Open Sans" panose="020B0606030504020204" pitchFamily="34" charset="0"/>
+                  <a:cs typeface="Open Sans" panose="020B0606030504020204" pitchFamily="34" charset="0"/>
+                </a:rPr>
+                <a:t>Census </a:t>
+              </a:r>
+              <a:r>
+                <a:rPr lang="en-US" sz="1400" b="0" i="0" strike="noStrike" dirty="0">
+                  <a:effectLst/>
+                  <a:latin typeface="Open Sans" panose="020B0606030504020204" pitchFamily="34" charset="0"/>
+                  <a:ea typeface="Open Sans" panose="020B0606030504020204" pitchFamily="34" charset="0"/>
+                  <a:cs typeface="Open Sans" panose="020B0606030504020204" pitchFamily="34" charset="0"/>
+                </a:rPr>
+                <a:t>= County Tract/ City Tract &amp; Year - income/employment/</a:t>
+              </a:r>
+              <a:r>
+                <a:rPr lang="en-US" sz="1400" b="0" i="0" strike="noStrike" dirty="0" err="1">
+                  <a:effectLst/>
+                  <a:latin typeface="Open Sans" panose="020B0606030504020204" pitchFamily="34" charset="0"/>
+                  <a:ea typeface="Open Sans" panose="020B0606030504020204" pitchFamily="34" charset="0"/>
+                  <a:cs typeface="Open Sans" panose="020B0606030504020204" pitchFamily="34" charset="0"/>
+                </a:rPr>
+                <a:t>etc</a:t>
+              </a:r>
+              <a:endParaRPr lang="en-US" sz="1400" b="0" i="0" strike="noStrike" dirty="0">
+                <a:effectLst/>
+                <a:latin typeface="Open Sans" panose="020B0606030504020204" pitchFamily="34" charset="0"/>
+                <a:ea typeface="Open Sans" panose="020B0606030504020204" pitchFamily="34" charset="0"/>
+                <a:cs typeface="Open Sans" panose="020B0606030504020204" pitchFamily="34" charset="0"/>
+              </a:endParaRPr>
+            </a:p>
+            <a:p>
+              <a:pPr rtl="0">
+                <a:spcBef>
+                  <a:spcPts val="0"/>
+                </a:spcBef>
+                <a:spcAft>
+                  <a:spcPts val="0"/>
+                </a:spcAft>
+              </a:pPr>
+              <a:r>
+                <a:rPr lang="en-US" sz="1400" b="1" i="0" strike="noStrike" dirty="0">
+                  <a:effectLst/>
+                  <a:latin typeface="Open Sans" panose="020B0606030504020204" pitchFamily="34" charset="0"/>
+                  <a:ea typeface="Open Sans" panose="020B0606030504020204" pitchFamily="34" charset="0"/>
+                  <a:cs typeface="Open Sans" panose="020B0606030504020204" pitchFamily="34" charset="0"/>
+                </a:rPr>
+                <a:t>500 Cities Project </a:t>
+              </a:r>
+              <a:r>
+                <a:rPr lang="en-US" sz="1400" b="0" i="0" strike="noStrike" dirty="0">
+                  <a:effectLst/>
+                  <a:latin typeface="Open Sans" panose="020B0606030504020204" pitchFamily="34" charset="0"/>
+                  <a:ea typeface="Open Sans" panose="020B0606030504020204" pitchFamily="34" charset="0"/>
+                  <a:cs typeface="Open Sans" panose="020B0606030504020204" pitchFamily="34" charset="0"/>
+                </a:rPr>
+                <a:t>= City Tract &amp; Year 2016/2017 (possibly more years) - wide variety of health data</a:t>
+              </a:r>
+            </a:p>
+            <a:p>
+              <a:pPr rtl="0">
+                <a:spcBef>
+                  <a:spcPts val="0"/>
+                </a:spcBef>
+                <a:spcAft>
+                  <a:spcPts val="0"/>
+                </a:spcAft>
+              </a:pPr>
+              <a:r>
+                <a:rPr lang="en-US" sz="1400" b="1" i="0" strike="noStrike" dirty="0">
+                  <a:effectLst/>
+                  <a:latin typeface="Open Sans" panose="020B0606030504020204" pitchFamily="34" charset="0"/>
+                  <a:ea typeface="Open Sans" panose="020B0606030504020204" pitchFamily="34" charset="0"/>
+                  <a:cs typeface="Open Sans" panose="020B0606030504020204" pitchFamily="34" charset="0"/>
+                </a:rPr>
+                <a:t>ARCOS </a:t>
+              </a:r>
+              <a:r>
+                <a:rPr lang="en-US" sz="1400" b="0" i="0" strike="noStrike" dirty="0">
+                  <a:effectLst/>
+                  <a:latin typeface="Open Sans" panose="020B0606030504020204" pitchFamily="34" charset="0"/>
+                  <a:ea typeface="Open Sans" panose="020B0606030504020204" pitchFamily="34" charset="0"/>
+                  <a:cs typeface="Open Sans" panose="020B0606030504020204" pitchFamily="34" charset="0"/>
+                </a:rPr>
+                <a:t>= City/county &amp; date 2006-2019 - </a:t>
+              </a:r>
+              <a:r>
+                <a:rPr lang="en-US" sz="1400" b="0" i="0" strike="noStrike" dirty="0" err="1">
+                  <a:effectLst/>
+                  <a:latin typeface="Open Sans" panose="020B0606030504020204" pitchFamily="34" charset="0"/>
+                  <a:ea typeface="Open Sans" panose="020B0606030504020204" pitchFamily="34" charset="0"/>
+                  <a:cs typeface="Open Sans" panose="020B0606030504020204" pitchFamily="34" charset="0"/>
+                </a:rPr>
+                <a:t>opiod</a:t>
+              </a:r>
+              <a:r>
+                <a:rPr lang="en-US" sz="1400" b="0" i="0" strike="noStrike" dirty="0">
+                  <a:effectLst/>
+                  <a:latin typeface="Open Sans" panose="020B0606030504020204" pitchFamily="34" charset="0"/>
+                  <a:ea typeface="Open Sans" panose="020B0606030504020204" pitchFamily="34" charset="0"/>
+                  <a:cs typeface="Open Sans" panose="020B0606030504020204" pitchFamily="34" charset="0"/>
+                </a:rPr>
+                <a:t> drug purchases from manufacturer to supplier</a:t>
+              </a:r>
+            </a:p>
+            <a:p>
+              <a:pPr rtl="0">
+                <a:spcBef>
+                  <a:spcPts val="0"/>
+                </a:spcBef>
+                <a:spcAft>
+                  <a:spcPts val="0"/>
+                </a:spcAft>
+              </a:pPr>
+              <a:endParaRPr lang="en-US" sz="1400" b="0" i="0" strike="noStrike" dirty="0">
+                <a:effectLst/>
+                <a:latin typeface="Open Sans" panose="020B0606030504020204" pitchFamily="34" charset="0"/>
+                <a:ea typeface="Open Sans" panose="020B0606030504020204" pitchFamily="34" charset="0"/>
+                <a:cs typeface="Open Sans" panose="020B0606030504020204" pitchFamily="34" charset="0"/>
+              </a:endParaRPr>
+            </a:p>
+            <a:p>
+              <a:pPr rtl="0">
+                <a:spcBef>
+                  <a:spcPts val="0"/>
+                </a:spcBef>
+                <a:spcAft>
+                  <a:spcPts val="0"/>
+                </a:spcAft>
+              </a:pPr>
+              <a:endParaRPr lang="en-US" sz="1400" b="1" i="0" strike="noStrike" dirty="0">
+                <a:effectLst/>
+                <a:latin typeface="Open Sans" panose="020B0606030504020204" pitchFamily="34" charset="0"/>
+                <a:ea typeface="Open Sans" panose="020B0606030504020204" pitchFamily="34" charset="0"/>
+                <a:cs typeface="Open Sans" panose="020B0606030504020204" pitchFamily="34" charset="0"/>
+              </a:endParaRPr>
+            </a:p>
+            <a:p>
+              <a:pPr rtl="0">
+                <a:spcBef>
+                  <a:spcPts val="0"/>
+                </a:spcBef>
+                <a:spcAft>
+                  <a:spcPts val="0"/>
+                </a:spcAft>
+              </a:pPr>
+              <a:r>
+                <a:rPr lang="en-US" sz="1400" b="1" i="0" strike="noStrike" dirty="0">
+                  <a:effectLst/>
+                  <a:latin typeface="Open Sans" panose="020B0606030504020204" pitchFamily="34" charset="0"/>
+                  <a:ea typeface="Open Sans" panose="020B0606030504020204" pitchFamily="34" charset="0"/>
+                  <a:cs typeface="Open Sans" panose="020B0606030504020204" pitchFamily="34" charset="0"/>
+                </a:rPr>
+                <a:t>Potential Target Variable:</a:t>
+              </a:r>
+            </a:p>
+            <a:p>
+              <a:pPr rtl="0">
+                <a:spcBef>
+                  <a:spcPts val="0"/>
+                </a:spcBef>
+                <a:spcAft>
+                  <a:spcPts val="0"/>
+                </a:spcAft>
+              </a:pPr>
+              <a:endParaRPr lang="en-US" sz="1400" b="0" i="0" strike="noStrike" dirty="0">
+                <a:effectLst/>
+                <a:latin typeface="Open Sans" panose="020B0606030504020204" pitchFamily="34" charset="0"/>
+                <a:ea typeface="Open Sans" panose="020B0606030504020204" pitchFamily="34" charset="0"/>
+                <a:cs typeface="Open Sans" panose="020B0606030504020204" pitchFamily="34" charset="0"/>
+              </a:endParaRPr>
+            </a:p>
+            <a:p>
+              <a:pPr rtl="0">
+                <a:spcBef>
+                  <a:spcPts val="0"/>
+                </a:spcBef>
+                <a:spcAft>
+                  <a:spcPts val="0"/>
+                </a:spcAft>
+              </a:pPr>
+              <a:r>
+                <a:rPr lang="en-US" sz="1400" b="1" i="0" strike="noStrike" dirty="0">
+                  <a:effectLst/>
+                  <a:latin typeface="Open Sans" panose="020B0606030504020204" pitchFamily="34" charset="0"/>
+                  <a:ea typeface="Open Sans" panose="020B0606030504020204" pitchFamily="34" charset="0"/>
+                  <a:cs typeface="Open Sans" panose="020B0606030504020204" pitchFamily="34" charset="0"/>
+                </a:rPr>
+                <a:t>Rise in crime (city-level)</a:t>
+              </a:r>
+            </a:p>
+            <a:p>
+              <a:pPr rtl="0">
+                <a:spcBef>
+                  <a:spcPts val="0"/>
+                </a:spcBef>
+                <a:spcAft>
+                  <a:spcPts val="0"/>
+                </a:spcAft>
+              </a:pPr>
+              <a:r>
+                <a:rPr lang="en-US" sz="1400" b="0" i="0" strike="noStrike" dirty="0">
+                  <a:effectLst/>
+                  <a:latin typeface="Open Sans" panose="020B0606030504020204" pitchFamily="34" charset="0"/>
+                  <a:ea typeface="Open Sans" panose="020B0606030504020204" pitchFamily="34" charset="0"/>
+                  <a:cs typeface="Open Sans" panose="020B0606030504020204" pitchFamily="34" charset="0"/>
+                </a:rPr>
+                <a:t>Ex: What are good predictors for rise in crime from one year to the next at the city level? </a:t>
+              </a:r>
+            </a:p>
+            <a:p>
+              <a:pPr rtl="0">
+                <a:spcBef>
+                  <a:spcPts val="0"/>
+                </a:spcBef>
+                <a:spcAft>
+                  <a:spcPts val="0"/>
+                </a:spcAft>
+              </a:pPr>
+              <a:endParaRPr lang="en-US" sz="1400" b="0" i="0" strike="noStrike" dirty="0">
+                <a:effectLst/>
+                <a:latin typeface="Open Sans" panose="020B0606030504020204" pitchFamily="34" charset="0"/>
+                <a:ea typeface="Open Sans" panose="020B0606030504020204" pitchFamily="34" charset="0"/>
+                <a:cs typeface="Open Sans" panose="020B0606030504020204" pitchFamily="34" charset="0"/>
+              </a:endParaRPr>
+            </a:p>
+          </p:txBody>
+        </p:sp>
+        <p:sp>
+          <p:nvSpPr>
+            <p:cNvPr id="2" name="TextBox 1">
+              <a:extLst>
+                <a:ext uri="{FF2B5EF4-FFF2-40B4-BE49-F238E27FC236}">
+                  <a16:creationId xmlns:a16="http://schemas.microsoft.com/office/drawing/2014/main" id="{A6F2B28A-22B1-2792-E515-BB11AC0A410C}"/>
+                </a:ext>
+              </a:extLst>
+            </p:cNvPr>
+            <p:cNvSpPr txBox="1"/>
+            <p:nvPr/>
+          </p:nvSpPr>
+          <p:spPr>
+            <a:xfrm>
+              <a:off x="6334467" y="2483955"/>
+              <a:ext cx="5507802" cy="4431983"/>
+            </a:xfrm>
+            <a:prstGeom prst="rect">
+              <a:avLst/>
+            </a:prstGeom>
+            <a:noFill/>
+          </p:spPr>
+          <p:txBody>
+            <a:bodyPr wrap="square">
+              <a:spAutoFit/>
+            </a:bodyPr>
+            <a:lstStyle/>
+            <a:p>
+              <a:pPr rtl="0">
+                <a:spcBef>
+                  <a:spcPts val="0"/>
+                </a:spcBef>
+                <a:spcAft>
+                  <a:spcPts val="0"/>
+                </a:spcAft>
+              </a:pPr>
+              <a:r>
+                <a:rPr lang="en-US" sz="1600" b="1" i="0" strike="noStrike" dirty="0">
+                  <a:effectLst/>
+                  <a:latin typeface="Open Sans" panose="020B0606030504020204" pitchFamily="34" charset="0"/>
+                  <a:ea typeface="Open Sans" panose="020B0606030504020204" pitchFamily="34" charset="0"/>
+                  <a:cs typeface="Open Sans" panose="020B0606030504020204" pitchFamily="34" charset="0"/>
+                </a:rPr>
+                <a:t>By County:</a:t>
+              </a:r>
+            </a:p>
+            <a:p>
+              <a:pPr rtl="0">
+                <a:spcBef>
+                  <a:spcPts val="0"/>
+                </a:spcBef>
+                <a:spcAft>
+                  <a:spcPts val="0"/>
+                </a:spcAft>
+              </a:pPr>
+              <a:endParaRPr lang="en-US" sz="1400" b="0" i="0" strike="noStrike" dirty="0">
+                <a:effectLst/>
+                <a:latin typeface="Open Sans" panose="020B0606030504020204" pitchFamily="34" charset="0"/>
+                <a:ea typeface="Open Sans" panose="020B0606030504020204" pitchFamily="34" charset="0"/>
+                <a:cs typeface="Open Sans" panose="020B0606030504020204" pitchFamily="34" charset="0"/>
+              </a:endParaRPr>
+            </a:p>
+            <a:p>
+              <a:pPr rtl="0">
+                <a:spcBef>
+                  <a:spcPts val="0"/>
+                </a:spcBef>
+                <a:spcAft>
+                  <a:spcPts val="0"/>
+                </a:spcAft>
+              </a:pPr>
+              <a:r>
+                <a:rPr lang="en-US" sz="1400" b="1" i="0" strike="noStrike" dirty="0">
+                  <a:effectLst/>
+                  <a:latin typeface="Open Sans" panose="020B0606030504020204" pitchFamily="34" charset="0"/>
+                  <a:ea typeface="Open Sans" panose="020B0606030504020204" pitchFamily="34" charset="0"/>
+                  <a:cs typeface="Open Sans" panose="020B0606030504020204" pitchFamily="34" charset="0"/>
+                </a:rPr>
+                <a:t>HPSA</a:t>
+              </a:r>
+              <a:r>
+                <a:rPr lang="en-US" sz="1400" b="0" i="0" strike="noStrike" dirty="0">
+                  <a:effectLst/>
+                  <a:latin typeface="Open Sans" panose="020B0606030504020204" pitchFamily="34" charset="0"/>
+                  <a:ea typeface="Open Sans" panose="020B0606030504020204" pitchFamily="34" charset="0"/>
+                  <a:cs typeface="Open Sans" panose="020B0606030504020204" pitchFamily="34" charset="0"/>
+                </a:rPr>
+                <a:t> = County Tract &amp; static Year Range - Health care shortages</a:t>
+              </a:r>
+            </a:p>
+            <a:p>
+              <a:pPr rtl="0">
+                <a:spcBef>
+                  <a:spcPts val="0"/>
+                </a:spcBef>
+                <a:spcAft>
+                  <a:spcPts val="0"/>
+                </a:spcAft>
+              </a:pPr>
+              <a:r>
+                <a:rPr lang="en-US" sz="1400" b="1" i="0" strike="noStrike" dirty="0">
+                  <a:effectLst/>
+                  <a:latin typeface="Open Sans" panose="020B0606030504020204" pitchFamily="34" charset="0"/>
+                  <a:ea typeface="Open Sans" panose="020B0606030504020204" pitchFamily="34" charset="0"/>
+                  <a:cs typeface="Open Sans" panose="020B0606030504020204" pitchFamily="34" charset="0"/>
+                </a:rPr>
+                <a:t>ARCOS</a:t>
+              </a:r>
+              <a:r>
+                <a:rPr lang="en-US" sz="1400" b="0" i="0" strike="noStrike" dirty="0">
+                  <a:effectLst/>
+                  <a:latin typeface="Open Sans" panose="020B0606030504020204" pitchFamily="34" charset="0"/>
+                  <a:ea typeface="Open Sans" panose="020B0606030504020204" pitchFamily="34" charset="0"/>
+                  <a:cs typeface="Open Sans" panose="020B0606030504020204" pitchFamily="34" charset="0"/>
+                </a:rPr>
+                <a:t> = City/county &amp; date 2006-2019 - opioid drug purchases from manufacturer to supplier</a:t>
+              </a:r>
+            </a:p>
+            <a:p>
+              <a:pPr rtl="0">
+                <a:spcBef>
+                  <a:spcPts val="0"/>
+                </a:spcBef>
+                <a:spcAft>
+                  <a:spcPts val="0"/>
+                </a:spcAft>
+              </a:pPr>
+              <a:r>
+                <a:rPr lang="en-US" sz="1400" b="1" i="0" strike="noStrike" dirty="0">
+                  <a:effectLst/>
+                  <a:latin typeface="Open Sans" panose="020B0606030504020204" pitchFamily="34" charset="0"/>
+                  <a:ea typeface="Open Sans" panose="020B0606030504020204" pitchFamily="34" charset="0"/>
+                  <a:cs typeface="Open Sans" panose="020B0606030504020204" pitchFamily="34" charset="0"/>
+                </a:rPr>
+                <a:t>CDC Cause of Death </a:t>
+              </a:r>
+              <a:r>
+                <a:rPr lang="en-US" sz="1400" b="0" i="0" strike="noStrike" dirty="0">
+                  <a:effectLst/>
+                  <a:latin typeface="Open Sans" panose="020B0606030504020204" pitchFamily="34" charset="0"/>
+                  <a:ea typeface="Open Sans" panose="020B0606030504020204" pitchFamily="34" charset="0"/>
+                  <a:cs typeface="Open Sans" panose="020B0606030504020204" pitchFamily="34" charset="0"/>
+                </a:rPr>
+                <a:t>= County &amp; Years between 2018-2021 - overdose</a:t>
+              </a:r>
+            </a:p>
+            <a:p>
+              <a:pPr rtl="0">
+                <a:spcBef>
+                  <a:spcPts val="0"/>
+                </a:spcBef>
+                <a:spcAft>
+                  <a:spcPts val="0"/>
+                </a:spcAft>
+              </a:pPr>
+              <a:r>
+                <a:rPr lang="en-US" sz="1400" b="1" i="0" strike="noStrike" dirty="0">
+                  <a:effectLst/>
+                  <a:latin typeface="Open Sans" panose="020B0606030504020204" pitchFamily="34" charset="0"/>
+                  <a:ea typeface="Open Sans" panose="020B0606030504020204" pitchFamily="34" charset="0"/>
+                  <a:cs typeface="Open Sans" panose="020B0606030504020204" pitchFamily="34" charset="0"/>
+                </a:rPr>
+                <a:t>Census</a:t>
+              </a:r>
+              <a:r>
+                <a:rPr lang="en-US" sz="1400" b="0" i="0" strike="noStrike" dirty="0">
+                  <a:effectLst/>
+                  <a:latin typeface="Open Sans" panose="020B0606030504020204" pitchFamily="34" charset="0"/>
+                  <a:ea typeface="Open Sans" panose="020B0606030504020204" pitchFamily="34" charset="0"/>
+                  <a:cs typeface="Open Sans" panose="020B0606030504020204" pitchFamily="34" charset="0"/>
+                </a:rPr>
+                <a:t> = County Tract/ City Tract &amp; Year - income/employment/</a:t>
+              </a:r>
+              <a:r>
+                <a:rPr lang="en-US" sz="1400" b="0" i="0" strike="noStrike" dirty="0" err="1">
+                  <a:effectLst/>
+                  <a:latin typeface="Open Sans" panose="020B0606030504020204" pitchFamily="34" charset="0"/>
+                  <a:ea typeface="Open Sans" panose="020B0606030504020204" pitchFamily="34" charset="0"/>
+                  <a:cs typeface="Open Sans" panose="020B0606030504020204" pitchFamily="34" charset="0"/>
+                </a:rPr>
+                <a:t>etc</a:t>
+              </a:r>
+              <a:endParaRPr lang="en-US" sz="1400" b="0" i="0" strike="noStrike" dirty="0">
+                <a:effectLst/>
+                <a:latin typeface="Open Sans" panose="020B0606030504020204" pitchFamily="34" charset="0"/>
+                <a:ea typeface="Open Sans" panose="020B0606030504020204" pitchFamily="34" charset="0"/>
+                <a:cs typeface="Open Sans" panose="020B0606030504020204" pitchFamily="34" charset="0"/>
+              </a:endParaRPr>
+            </a:p>
+            <a:p>
+              <a:pPr rtl="0">
+                <a:spcBef>
+                  <a:spcPts val="0"/>
+                </a:spcBef>
+                <a:spcAft>
+                  <a:spcPts val="0"/>
+                </a:spcAft>
+              </a:pPr>
+              <a:r>
+                <a:rPr lang="en-US" sz="1400" b="1" i="0" strike="noStrike" dirty="0">
+                  <a:effectLst/>
+                  <a:latin typeface="Open Sans" panose="020B0606030504020204" pitchFamily="34" charset="0"/>
+                  <a:ea typeface="Open Sans" panose="020B0606030504020204" pitchFamily="34" charset="0"/>
+                  <a:cs typeface="Open Sans" panose="020B0606030504020204" pitchFamily="34" charset="0"/>
+                </a:rPr>
+                <a:t>FBI LE </a:t>
+              </a:r>
+              <a:r>
+                <a:rPr lang="en-US" sz="1400" b="0" i="0" strike="noStrike" dirty="0">
+                  <a:effectLst/>
+                  <a:latin typeface="Open Sans" panose="020B0606030504020204" pitchFamily="34" charset="0"/>
+                  <a:ea typeface="Open Sans" panose="020B0606030504020204" pitchFamily="34" charset="0"/>
+                  <a:cs typeface="Open Sans" panose="020B0606030504020204" pitchFamily="34" charset="0"/>
+                </a:rPr>
+                <a:t>= County &amp; Year - full time law enforcement officers </a:t>
+              </a:r>
+            </a:p>
+            <a:p>
+              <a:pPr rtl="0">
+                <a:spcBef>
+                  <a:spcPts val="0"/>
+                </a:spcBef>
+                <a:spcAft>
+                  <a:spcPts val="0"/>
+                </a:spcAft>
+              </a:pPr>
+              <a:endParaRPr lang="en-US" sz="1400" b="0" i="0" strike="noStrike" dirty="0">
+                <a:effectLst/>
+                <a:latin typeface="Open Sans" panose="020B0606030504020204" pitchFamily="34" charset="0"/>
+                <a:ea typeface="Open Sans" panose="020B0606030504020204" pitchFamily="34" charset="0"/>
+                <a:cs typeface="Open Sans" panose="020B0606030504020204" pitchFamily="34" charset="0"/>
+              </a:endParaRPr>
+            </a:p>
+            <a:p>
+              <a:pPr rtl="0">
+                <a:spcBef>
+                  <a:spcPts val="0"/>
+                </a:spcBef>
+                <a:spcAft>
+                  <a:spcPts val="0"/>
+                </a:spcAft>
+              </a:pPr>
+              <a:r>
+                <a:rPr lang="en-US" sz="1400" b="1" i="0" strike="noStrike" dirty="0">
+                  <a:effectLst/>
+                  <a:latin typeface="Open Sans" panose="020B0606030504020204" pitchFamily="34" charset="0"/>
+                  <a:ea typeface="Open Sans" panose="020B0606030504020204" pitchFamily="34" charset="0"/>
+                  <a:cs typeface="Open Sans" panose="020B0606030504020204" pitchFamily="34" charset="0"/>
+                </a:rPr>
+                <a:t>Potential Target Variable: </a:t>
+              </a:r>
+            </a:p>
+            <a:p>
+              <a:pPr rtl="0">
+                <a:spcBef>
+                  <a:spcPts val="0"/>
+                </a:spcBef>
+                <a:spcAft>
+                  <a:spcPts val="0"/>
+                </a:spcAft>
+              </a:pPr>
+              <a:endParaRPr lang="en-US" sz="1400" b="1" i="0" strike="noStrike" dirty="0">
+                <a:effectLst/>
+                <a:latin typeface="Open Sans" panose="020B0606030504020204" pitchFamily="34" charset="0"/>
+                <a:ea typeface="Open Sans" panose="020B0606030504020204" pitchFamily="34" charset="0"/>
+                <a:cs typeface="Open Sans" panose="020B0606030504020204" pitchFamily="34" charset="0"/>
+              </a:endParaRPr>
+            </a:p>
+            <a:p>
+              <a:pPr rtl="0">
+                <a:spcBef>
+                  <a:spcPts val="0"/>
+                </a:spcBef>
+                <a:spcAft>
+                  <a:spcPts val="0"/>
+                </a:spcAft>
+              </a:pPr>
+              <a:r>
+                <a:rPr lang="en-US" sz="1400" b="1" i="0" strike="noStrike" dirty="0">
+                  <a:effectLst/>
+                  <a:latin typeface="Open Sans" panose="020B0606030504020204" pitchFamily="34" charset="0"/>
+                  <a:ea typeface="Open Sans" panose="020B0606030504020204" pitchFamily="34" charset="0"/>
+                  <a:cs typeface="Open Sans" panose="020B0606030504020204" pitchFamily="34" charset="0"/>
+                </a:rPr>
+                <a:t>Health care shortage </a:t>
+              </a:r>
+              <a:r>
+                <a:rPr lang="en-US" sz="1400" b="0" i="0" strike="noStrike" dirty="0">
+                  <a:effectLst/>
+                  <a:latin typeface="Open Sans" panose="020B0606030504020204" pitchFamily="34" charset="0"/>
+                  <a:ea typeface="Open Sans" panose="020B0606030504020204" pitchFamily="34" charset="0"/>
+                  <a:cs typeface="Open Sans" panose="020B0606030504020204" pitchFamily="34" charset="0"/>
+                </a:rPr>
+                <a:t>(either at the county level using all available data or at the county tract level using just census data)</a:t>
+              </a:r>
+            </a:p>
+            <a:p>
+              <a:pPr rtl="0">
+                <a:spcBef>
+                  <a:spcPts val="0"/>
+                </a:spcBef>
+                <a:spcAft>
+                  <a:spcPts val="0"/>
+                </a:spcAft>
+              </a:pPr>
+              <a:r>
+                <a:rPr lang="en-US" sz="1400" b="0" i="0" strike="noStrike" dirty="0">
+                  <a:effectLst/>
+                  <a:latin typeface="Open Sans" panose="020B0606030504020204" pitchFamily="34" charset="0"/>
+                  <a:ea typeface="Open Sans" panose="020B0606030504020204" pitchFamily="34" charset="0"/>
+                  <a:cs typeface="Open Sans" panose="020B0606030504020204" pitchFamily="34" charset="0"/>
+                </a:rPr>
+                <a:t>Ex 1: Can we predict whether a census tract will be an HPSA given general census data?</a:t>
+              </a:r>
+            </a:p>
+            <a:p>
+              <a:pPr rtl="0">
+                <a:spcBef>
+                  <a:spcPts val="0"/>
+                </a:spcBef>
+                <a:spcAft>
+                  <a:spcPts val="0"/>
+                </a:spcAft>
+              </a:pPr>
+              <a:r>
+                <a:rPr lang="en-US" sz="1400" b="0" i="0" strike="noStrike" dirty="0">
+                  <a:effectLst/>
+                  <a:latin typeface="Open Sans" panose="020B0606030504020204" pitchFamily="34" charset="0"/>
+                  <a:ea typeface="Open Sans" panose="020B0606030504020204" pitchFamily="34" charset="0"/>
+                  <a:cs typeface="Open Sans" panose="020B0606030504020204" pitchFamily="34" charset="0"/>
+                </a:rPr>
+                <a:t>Ex 2: What are good predictors for determining the severity of a health care shortage in a given County?</a:t>
+              </a:r>
+              <a:endParaRPr lang="en-US" sz="1050" dirty="0"/>
+            </a:p>
+            <a:p>
+              <a:pPr rtl="0">
+                <a:spcBef>
+                  <a:spcPts val="0"/>
+                </a:spcBef>
+                <a:spcAft>
+                  <a:spcPts val="0"/>
+                </a:spcAft>
+              </a:pPr>
+              <a:endParaRPr lang="en-US" sz="1400" b="0" i="0" strike="noStrike" dirty="0">
+                <a:effectLst/>
+                <a:latin typeface="Open Sans" panose="020B0606030504020204" pitchFamily="34" charset="0"/>
+                <a:ea typeface="Open Sans" panose="020B0606030504020204" pitchFamily="34" charset="0"/>
+                <a:cs typeface="Open Sans" panose="020B0606030504020204" pitchFamily="34" charset="0"/>
+              </a:endParaRPr>
+            </a:p>
+          </p:txBody>
+        </p:sp>
+        <p:cxnSp>
+          <p:nvCxnSpPr>
+            <p:cNvPr id="15" name="Straight Connector 14">
+              <a:extLst>
+                <a:ext uri="{FF2B5EF4-FFF2-40B4-BE49-F238E27FC236}">
+                  <a16:creationId xmlns:a16="http://schemas.microsoft.com/office/drawing/2014/main" id="{CBCF58B4-FC9A-BE4A-87D9-F6E3DC413E6C}"/>
+                </a:ext>
+              </a:extLst>
+            </p:cNvPr>
+            <p:cNvCxnSpPr>
+              <a:cxnSpLocks/>
+              <a:endCxn id="21" idx="2"/>
+            </p:cNvCxnSpPr>
+            <p:nvPr/>
+          </p:nvCxnSpPr>
+          <p:spPr>
+            <a:xfrm>
+              <a:off x="6215865" y="2350389"/>
+              <a:ext cx="0" cy="4431983"/>
+            </a:xfrm>
+            <a:prstGeom prst="line">
+              <a:avLst/>
+            </a:prstGeom>
+          </p:spPr>
+          <p:style>
+            <a:lnRef idx="2">
+              <a:schemeClr val="accent1"/>
+            </a:lnRef>
+            <a:fillRef idx="0">
+              <a:schemeClr val="accent1"/>
+            </a:fillRef>
+            <a:effectRef idx="1">
+              <a:schemeClr val="accent1"/>
+            </a:effectRef>
+            <a:fontRef idx="minor">
+              <a:schemeClr val="tx1"/>
+            </a:fontRef>
+          </p:style>
+        </p:cxnSp>
+        <p:sp>
+          <p:nvSpPr>
+            <p:cNvPr id="21" name="Rectangle 20">
+              <a:extLst>
+                <a:ext uri="{FF2B5EF4-FFF2-40B4-BE49-F238E27FC236}">
+                  <a16:creationId xmlns:a16="http://schemas.microsoft.com/office/drawing/2014/main" id="{DDB4FA28-F408-3D3D-011F-61A56FC0DBE7}"/>
+                </a:ext>
+              </a:extLst>
+            </p:cNvPr>
+            <p:cNvSpPr/>
+            <p:nvPr/>
+          </p:nvSpPr>
+          <p:spPr>
+            <a:xfrm>
+              <a:off x="534256" y="2350389"/>
+              <a:ext cx="11363218" cy="4431983"/>
+            </a:xfrm>
+            <a:prstGeom prst="rect">
+              <a:avLst/>
+            </a:prstGeom>
+            <a:noFill/>
+          </p:spPr>
+          <p:style>
+            <a:lnRef idx="2">
+              <a:schemeClr val="accent6"/>
+            </a:lnRef>
+            <a:fillRef idx="1">
+              <a:schemeClr val="lt1"/>
+            </a:fillRef>
+            <a:effectRef idx="0">
+              <a:schemeClr val="accent6"/>
+            </a:effectRef>
+            <a:fontRef idx="minor">
+              <a:schemeClr val="dk1"/>
+            </a:fontRef>
+          </p:style>
+          <p:txBody>
+            <a:bodyPr rtlCol="0" anchor="ctr"/>
+            <a:lstStyle/>
+            <a:p>
+              <a:pPr algn="ctr"/>
+              <a:endParaRPr lang="en-US"/>
+            </a:p>
+          </p:txBody>
+        </p:sp>
+      </p:grpSp>
+      <p:sp>
+        <p:nvSpPr>
+          <p:cNvPr id="24" name="Rectangle 23">
+            <a:extLst>
+              <a:ext uri="{FF2B5EF4-FFF2-40B4-BE49-F238E27FC236}">
+                <a16:creationId xmlns:a16="http://schemas.microsoft.com/office/drawing/2014/main" id="{4007C043-53F3-9469-EB2A-2A59D22A3E87}"/>
+              </a:ext>
+            </a:extLst>
+          </p:cNvPr>
+          <p:cNvSpPr/>
+          <p:nvPr/>
+        </p:nvSpPr>
+        <p:spPr>
+          <a:xfrm>
+            <a:off x="375213" y="2186005"/>
+            <a:ext cx="11363217" cy="561279"/>
+          </a:xfrm>
+          <a:prstGeom prst="rect">
+            <a:avLst/>
+          </a:prstGeom>
+          <a:solidFill>
+            <a:schemeClr val="accent1">
+              <a:alpha val="30000"/>
+            </a:schemeClr>
+          </a:solidFill>
+        </p:spPr>
+        <p:style>
+          <a:lnRef idx="2">
+            <a:schemeClr val="accent1">
+              <a:shade val="15000"/>
+            </a:schemeClr>
+          </a:lnRef>
+          <a:fillRef idx="1">
+            <a:schemeClr val="accent1"/>
+          </a:fillRef>
+          <a:effectRef idx="0">
+            <a:schemeClr val="accent1"/>
+          </a:effectRef>
+          <a:fontRef idx="minor">
+            <a:schemeClr val="lt1"/>
+          </a:fontRef>
+        </p:style>
+        <p:txBody>
+          <a:bodyPr rtlCol="0" anchor="ctr"/>
+          <a:lstStyle/>
+          <a:p>
+            <a:pPr algn="ctr"/>
+            <a:endParaRPr lang="en-US"/>
+          </a:p>
+        </p:txBody>
+      </p:sp>
+    </p:spTree>
+    <p:extLst>
+      <p:ext uri="{BB962C8B-B14F-4D97-AF65-F5344CB8AC3E}">
+        <p14:creationId xmlns:p14="http://schemas.microsoft.com/office/powerpoint/2010/main" val="395504921"/>
+      </p:ext>
+    </p:extLst>
+  </p:cSld>
+  <p:clrMapOvr>
+    <a:masterClrMapping/>
+  </p:clrMapOvr>
+</p:sld>
+</file>
+
+<file path=ppt/slides/slide5.xml><?xml version="1.0" encoding="utf-8"?>
 <p:sld xmlns:a="http://schemas.openxmlformats.org/drawingml/2006/main" xmlns:r="http://schemas.openxmlformats.org/officeDocument/2006/relationships" xmlns:p="http://schemas.openxmlformats.org/presentationml/2006/main">
   <p:cSld>
     <p:bg>

</xml_diff>